<commit_message>
Tidied energy results journal, made more debug graphs
for some reason, EOL_onYear_## paths for IRENA are cumulative, but for PV ICE they are annual. This makes no sense.
</commit_message>
<xml_diff>
--- a/PV_ICE/baselines/Energy_CellModuleTechCompare/DEBUGIRENA.pptx
+++ b/PV_ICE/baselines/Energy_CellModuleTechCompare/DEBUGIRENA.pptx
@@ -13,12 +13,15 @@
     <p:sldId id="260" r:id="rId7"/>
     <p:sldId id="261" r:id="rId8"/>
     <p:sldId id="269" r:id="rId9"/>
-    <p:sldId id="263" r:id="rId10"/>
-    <p:sldId id="264" r:id="rId11"/>
-    <p:sldId id="265" r:id="rId12"/>
-    <p:sldId id="266" r:id="rId13"/>
-    <p:sldId id="267" r:id="rId14"/>
-    <p:sldId id="268" r:id="rId15"/>
+    <p:sldId id="270" r:id="rId10"/>
+    <p:sldId id="271" r:id="rId11"/>
+    <p:sldId id="272" r:id="rId12"/>
+    <p:sldId id="263" r:id="rId13"/>
+    <p:sldId id="264" r:id="rId14"/>
+    <p:sldId id="265" r:id="rId15"/>
+    <p:sldId id="266" r:id="rId16"/>
+    <p:sldId id="267" r:id="rId17"/>
+    <p:sldId id="268" r:id="rId18"/>
   </p:sldIdLst>
   <p:sldSz cx="12192000" cy="6858000"/>
   <p:notesSz cx="6858000" cy="9144000"/>
@@ -117,6 +120,11 @@
       </a:defRPr>
     </a:lvl9pPr>
   </p:defaultTextStyle>
+  <p:extLst>
+    <p:ext uri="{EFAFB233-063F-42B5-8137-9DF3F51BA10A}">
+      <p15:sldGuideLst xmlns:p15="http://schemas.microsoft.com/office/powerpoint/2012/main"/>
+    </p:ext>
+  </p:extLst>
 </p:presentation>
 </file>
 
@@ -3419,10 +3427,10 @@
       </p:grpSpPr>
       <p:sp>
         <p:nvSpPr>
-          <p:cNvPr id="6" name="Title 5">
-            <a:extLst>
-              <a:ext uri="{FF2B5EF4-FFF2-40B4-BE49-F238E27FC236}">
-                <a16:creationId xmlns:a16="http://schemas.microsoft.com/office/drawing/2014/main" id="{7C660CCF-2A48-B1FA-67BA-82A1045AE1EE}"/>
+          <p:cNvPr id="2" name="Title 1">
+            <a:extLst>
+              <a:ext uri="{FF2B5EF4-FFF2-40B4-BE49-F238E27FC236}">
+                <a16:creationId xmlns:a16="http://schemas.microsoft.com/office/drawing/2014/main" id="{6D572557-0D2A-7D06-3518-7F657BAF5C10}"/>
               </a:ext>
             </a:extLst>
           </p:cNvPr>
@@ -3433,31 +3441,24 @@
             <p:ph type="title"/>
           </p:nvPr>
         </p:nvSpPr>
-        <p:spPr>
-          <a:xfrm>
-            <a:off x="0" y="1"/>
-            <a:ext cx="9408160" cy="1110858"/>
-          </a:xfrm>
-        </p:spPr>
-        <p:txBody>
-          <a:bodyPr>
-            <a:normAutofit fontScale="90000"/>
-          </a:bodyPr>
-          <a:lstStyle/>
-          <a:p>
-            <a:r>
-              <a:rPr lang="en-US" dirty="0"/>
-              <a:t>Aggregate Results, both jagged and blow up</a:t>
+        <p:spPr/>
+        <p:txBody>
+          <a:bodyPr/>
+          <a:lstStyle/>
+          <a:p>
+            <a:r>
+              <a:rPr lang="en-US" dirty="0"/>
+              <a:t>EOL PBS also looks cumulative</a:t>
             </a:r>
           </a:p>
         </p:txBody>
       </p:sp>
       <p:pic>
         <p:nvPicPr>
-          <p:cNvPr id="10" name="Picture 9" descr="A picture containing text, diagram, plot, line&#10;&#10;Description automatically generated">
-            <a:extLst>
-              <a:ext uri="{FF2B5EF4-FFF2-40B4-BE49-F238E27FC236}">
-                <a16:creationId xmlns:a16="http://schemas.microsoft.com/office/drawing/2014/main" id="{A1E4679B-20A2-016C-01AA-883BE7FD2355}"/>
+          <p:cNvPr id="4" name="Picture 3">
+            <a:extLst>
+              <a:ext uri="{FF2B5EF4-FFF2-40B4-BE49-F238E27FC236}">
+                <a16:creationId xmlns:a16="http://schemas.microsoft.com/office/drawing/2014/main" id="{75F5CA74-5C14-6610-D841-89FF202DAF4E}"/>
               </a:ext>
             </a:extLst>
           </p:cNvPr>
@@ -3467,81 +3468,55 @@
           <p:nvPr/>
         </p:nvPicPr>
         <p:blipFill>
-          <a:blip r:embed="rId2">
-            <a:extLst>
-              <a:ext uri="{28A0092B-C50C-407E-A947-70E740481C1C}">
-                <a14:useLocalDpi xmlns:a14="http://schemas.microsoft.com/office/drawing/2010/main" val="0"/>
-              </a:ext>
-            </a:extLst>
-          </a:blip>
+          <a:blip r:embed="rId2"/>
           <a:stretch>
             <a:fillRect/>
           </a:stretch>
         </p:blipFill>
         <p:spPr>
           <a:xfrm>
-            <a:off x="0" y="1115997"/>
-            <a:ext cx="7924800" cy="5742004"/>
+            <a:off x="0" y="2052320"/>
+            <a:ext cx="6484649" cy="4759960"/>
           </a:xfrm>
           <a:prstGeom prst="rect">
             <a:avLst/>
           </a:prstGeom>
         </p:spPr>
       </p:pic>
-      <p:sp>
-        <p:nvSpPr>
-          <p:cNvPr id="11" name="TextBox 10">
-            <a:extLst>
-              <a:ext uri="{FF2B5EF4-FFF2-40B4-BE49-F238E27FC236}">
-                <a16:creationId xmlns:a16="http://schemas.microsoft.com/office/drawing/2014/main" id="{642EFF90-7C1C-58D6-DCCB-11AFC53DD141}"/>
-              </a:ext>
-            </a:extLst>
-          </p:cNvPr>
-          <p:cNvSpPr txBox="1"/>
+      <p:pic>
+        <p:nvPicPr>
+          <p:cNvPr id="6" name="Picture 5">
+            <a:extLst>
+              <a:ext uri="{FF2B5EF4-FFF2-40B4-BE49-F238E27FC236}">
+                <a16:creationId xmlns:a16="http://schemas.microsoft.com/office/drawing/2014/main" id="{9DD2514D-01E6-EAE9-C7E2-D8A6CF61445C}"/>
+              </a:ext>
+            </a:extLst>
+          </p:cNvPr>
+          <p:cNvPicPr>
+            <a:picLocks noChangeAspect="1"/>
+          </p:cNvPicPr>
           <p:nvPr/>
-        </p:nvSpPr>
-        <p:spPr>
-          <a:xfrm>
-            <a:off x="8046720" y="1452880"/>
-            <a:ext cx="4145280" cy="1477328"/>
+        </p:nvPicPr>
+        <p:blipFill>
+          <a:blip r:embed="rId3"/>
+          <a:stretch>
+            <a:fillRect/>
+          </a:stretch>
+        </p:blipFill>
+        <p:spPr>
+          <a:xfrm>
+            <a:off x="5705700" y="2098040"/>
+            <a:ext cx="6486299" cy="4759960"/>
           </a:xfrm>
           <a:prstGeom prst="rect">
             <a:avLst/>
           </a:prstGeom>
-          <a:noFill/>
-        </p:spPr>
-        <p:txBody>
-          <a:bodyPr wrap="square" rtlCol="0">
-            <a:spAutoFit/>
-          </a:bodyPr>
-          <a:lstStyle/>
-          <a:p>
-            <a:r>
-              <a:rPr lang="en-US" dirty="0"/>
-              <a:t>From iiyearly2, aggregate results function</a:t>
-            </a:r>
-          </a:p>
-          <a:p>
-            <a:r>
-              <a:rPr lang="en-US" dirty="0"/>
-              <a:t>This is demonstrating the jagged results as well as waste blowing up.</a:t>
-            </a:r>
-          </a:p>
-          <a:p>
-            <a:endParaRPr lang="en-US" dirty="0"/>
-          </a:p>
-          <a:p>
-            <a:r>
-              <a:rPr lang="en-US" dirty="0"/>
-              <a:t>PV ICE waste doesn’t blow up…?</a:t>
-            </a:r>
-          </a:p>
-        </p:txBody>
-      </p:sp>
+        </p:spPr>
+      </p:pic>
     </p:spTree>
     <p:extLst>
       <p:ext uri="{BB962C8B-B14F-4D97-AF65-F5344CB8AC3E}">
-        <p14:creationId xmlns:p14="http://schemas.microsoft.com/office/powerpoint/2010/main" val="3844964183"/>
+        <p14:creationId xmlns:p14="http://schemas.microsoft.com/office/powerpoint/2010/main" val="1589847219"/>
       </p:ext>
     </p:extLst>
   </p:cSld>
@@ -3573,7 +3548,7 @@
           <p:cNvPr id="2" name="Title 1">
             <a:extLst>
               <a:ext uri="{FF2B5EF4-FFF2-40B4-BE49-F238E27FC236}">
-                <a16:creationId xmlns:a16="http://schemas.microsoft.com/office/drawing/2014/main" id="{5DBE12CC-F2A3-C548-A755-B10D0D3F397D}"/>
+                <a16:creationId xmlns:a16="http://schemas.microsoft.com/office/drawing/2014/main" id="{6DC6C4FF-A876-632C-57BE-8996BFD391F6}"/>
               </a:ext>
             </a:extLst>
           </p:cNvPr>
@@ -3584,108 +3559,19 @@
             <p:ph type="title"/>
           </p:nvPr>
         </p:nvSpPr>
-        <p:spPr>
-          <a:xfrm>
-            <a:off x="0" y="0"/>
-            <a:ext cx="10515600" cy="825229"/>
-          </a:xfrm>
-        </p:spPr>
+        <p:spPr/>
         <p:txBody>
           <a:bodyPr/>
           <a:lstStyle/>
           <a:p>
-            <a:r>
-              <a:rPr lang="en-US" dirty="0" err="1"/>
-              <a:t>DataOut_m</a:t>
-            </a:r>
-            <a:r>
-              <a:rPr lang="en-US" dirty="0"/>
-              <a:t> shows both jagged and blow up?</a:t>
-            </a:r>
-          </a:p>
-        </p:txBody>
-      </p:sp>
-      <p:pic>
-        <p:nvPicPr>
-          <p:cNvPr id="4" name="Picture 3" descr="A graph with red and green lines&#10;&#10;Description automatically generated with low confidence">
-            <a:extLst>
-              <a:ext uri="{FF2B5EF4-FFF2-40B4-BE49-F238E27FC236}">
-                <a16:creationId xmlns:a16="http://schemas.microsoft.com/office/drawing/2014/main" id="{A422E2E7-E0E3-6258-3EA2-0E98D9248556}"/>
-              </a:ext>
-            </a:extLst>
-          </p:cNvPr>
-          <p:cNvPicPr>
-            <a:picLocks noChangeAspect="1"/>
-          </p:cNvPicPr>
-          <p:nvPr/>
-        </p:nvPicPr>
-        <p:blipFill>
-          <a:blip r:embed="rId2">
-            <a:extLst>
-              <a:ext uri="{28A0092B-C50C-407E-A947-70E740481C1C}">
-                <a14:useLocalDpi xmlns:a14="http://schemas.microsoft.com/office/drawing/2010/main" val="0"/>
-              </a:ext>
-            </a:extLst>
-          </a:blip>
-          <a:stretch>
-            <a:fillRect/>
-          </a:stretch>
-        </p:blipFill>
-        <p:spPr>
-          <a:xfrm>
-            <a:off x="0" y="825229"/>
-            <a:ext cx="8442960" cy="6032772"/>
-          </a:xfrm>
-          <a:prstGeom prst="rect">
-            <a:avLst/>
-          </a:prstGeom>
-        </p:spPr>
-      </p:pic>
-      <p:sp>
-        <p:nvSpPr>
-          <p:cNvPr id="5" name="TextBox 4">
-            <a:extLst>
-              <a:ext uri="{FF2B5EF4-FFF2-40B4-BE49-F238E27FC236}">
-                <a16:creationId xmlns:a16="http://schemas.microsoft.com/office/drawing/2014/main" id="{18A0F606-F313-93EC-72CF-9763D7C2D530}"/>
-              </a:ext>
-            </a:extLst>
-          </p:cNvPr>
-          <p:cNvSpPr txBox="1"/>
-          <p:nvPr/>
-        </p:nvSpPr>
-        <p:spPr>
-          <a:xfrm>
-            <a:off x="8442960" y="1046480"/>
-            <a:ext cx="3749040" cy="646331"/>
-          </a:xfrm>
-          <a:prstGeom prst="rect">
-            <a:avLst/>
-          </a:prstGeom>
-          <a:noFill/>
-        </p:spPr>
-        <p:txBody>
-          <a:bodyPr wrap="square" rtlCol="0">
-            <a:spAutoFit/>
-          </a:bodyPr>
-          <a:lstStyle/>
-          <a:p>
-            <a:r>
-              <a:rPr lang="en-US" dirty="0"/>
-              <a:t>Area disposed by failures and </a:t>
-            </a:r>
-          </a:p>
-          <a:p>
-            <a:r>
-              <a:rPr lang="en-US" dirty="0"/>
-              <a:t>Area disposed by project life</a:t>
-            </a:r>
+            <a:endParaRPr lang="en-US"/>
           </a:p>
         </p:txBody>
       </p:sp>
     </p:spTree>
     <p:extLst>
       <p:ext uri="{BB962C8B-B14F-4D97-AF65-F5344CB8AC3E}">
-        <p14:creationId xmlns:p14="http://schemas.microsoft.com/office/powerpoint/2010/main" val="1672804357"/>
+        <p14:creationId xmlns:p14="http://schemas.microsoft.com/office/powerpoint/2010/main" val="22193340"/>
       </p:ext>
     </p:extLst>
   </p:cSld>
@@ -3730,17 +3616,26 @@
         </p:nvSpPr>
         <p:spPr>
           <a:xfrm>
-            <a:off x="838200" y="2065338"/>
-            <a:ext cx="10515600" cy="2852737"/>
-          </a:xfrm>
-        </p:spPr>
-        <p:txBody>
-          <a:bodyPr/>
-          <a:lstStyle/>
-          <a:p>
-            <a:r>
-              <a:rPr lang="en-US" dirty="0"/>
-              <a:t>Remove the Trim year extension</a:t>
+            <a:off x="0" y="2246856"/>
+            <a:ext cx="10515600" cy="2916555"/>
+          </a:xfrm>
+        </p:spPr>
+        <p:txBody>
+          <a:bodyPr>
+            <a:normAutofit/>
+          </a:bodyPr>
+          <a:lstStyle/>
+          <a:p>
+            <a:r>
+              <a:rPr lang="en-US" sz="9600" dirty="0"/>
+              <a:t>Remove Trim</a:t>
+            </a:r>
+            <a:br>
+              <a:rPr lang="en-US" sz="9600" dirty="0"/>
+            </a:br>
+            <a:r>
+              <a:rPr lang="en-US" sz="9600" dirty="0"/>
+              <a:t> year extension</a:t>
             </a:r>
           </a:p>
         </p:txBody>
@@ -3779,17 +3674,17 @@
           <a:p>
             <a:r>
               <a:rPr lang="en-US" dirty="0"/>
-              <a:t>Use global projection through 2050</a:t>
+              <a:t>Used a 100.0 MW annual install</a:t>
             </a:r>
           </a:p>
         </p:txBody>
       </p:sp>
       <p:pic>
         <p:nvPicPr>
-          <p:cNvPr id="3" name="Picture 2" descr="A picture containing text, screenshot, plot, diagram&#10;&#10;Description automatically generated">
-            <a:extLst>
-              <a:ext uri="{FF2B5EF4-FFF2-40B4-BE49-F238E27FC236}">
-                <a16:creationId xmlns:a16="http://schemas.microsoft.com/office/drawing/2014/main" id="{ABA1E211-A53D-07BE-5767-EE874A2F3B30}"/>
+          <p:cNvPr id="7" name="Picture 6" descr="A picture containing text, screenshot, line, plot&#10;&#10;Description automatically generated">
+            <a:extLst>
+              <a:ext uri="{FF2B5EF4-FFF2-40B4-BE49-F238E27FC236}">
+                <a16:creationId xmlns:a16="http://schemas.microsoft.com/office/drawing/2014/main" id="{AA1485AC-8F57-2EFC-CDAD-ED3F3DC4F05A}"/>
               </a:ext>
             </a:extLst>
           </p:cNvPr>
@@ -3812,8 +3707,8 @@
         </p:blipFill>
         <p:spPr>
           <a:xfrm>
-            <a:off x="7043918" y="58670"/>
-            <a:ext cx="5148082" cy="3959360"/>
+            <a:off x="6842749" y="0"/>
+            <a:ext cx="5349251" cy="3959360"/>
           </a:xfrm>
           <a:prstGeom prst="rect">
             <a:avLst/>
@@ -3823,7 +3718,7 @@
     </p:spTree>
     <p:extLst>
       <p:ext uri="{BB962C8B-B14F-4D97-AF65-F5344CB8AC3E}">
-        <p14:creationId xmlns:p14="http://schemas.microsoft.com/office/powerpoint/2010/main" val="597274756"/>
+        <p14:creationId xmlns:p14="http://schemas.microsoft.com/office/powerpoint/2010/main" val="2196573499"/>
       </p:ext>
     </p:extLst>
   </p:cSld>
@@ -3874,6 +3769,439 @@
         </p:spPr>
         <p:txBody>
           <a:bodyPr>
+            <a:normAutofit fontScale="90000"/>
+          </a:bodyPr>
+          <a:lstStyle/>
+          <a:p>
+            <a:r>
+              <a:rPr lang="en-US" dirty="0"/>
+              <a:t>Aggregate Results, both jagged and blow up</a:t>
+            </a:r>
+          </a:p>
+        </p:txBody>
+      </p:sp>
+      <p:pic>
+        <p:nvPicPr>
+          <p:cNvPr id="10" name="Picture 9" descr="A picture containing text, diagram, plot, line&#10;&#10;Description automatically generated">
+            <a:extLst>
+              <a:ext uri="{FF2B5EF4-FFF2-40B4-BE49-F238E27FC236}">
+                <a16:creationId xmlns:a16="http://schemas.microsoft.com/office/drawing/2014/main" id="{A1E4679B-20A2-016C-01AA-883BE7FD2355}"/>
+              </a:ext>
+            </a:extLst>
+          </p:cNvPr>
+          <p:cNvPicPr>
+            <a:picLocks noChangeAspect="1"/>
+          </p:cNvPicPr>
+          <p:nvPr/>
+        </p:nvPicPr>
+        <p:blipFill>
+          <a:blip r:embed="rId2">
+            <a:extLst>
+              <a:ext uri="{28A0092B-C50C-407E-A947-70E740481C1C}">
+                <a14:useLocalDpi xmlns:a14="http://schemas.microsoft.com/office/drawing/2010/main" val="0"/>
+              </a:ext>
+            </a:extLst>
+          </a:blip>
+          <a:stretch>
+            <a:fillRect/>
+          </a:stretch>
+        </p:blipFill>
+        <p:spPr>
+          <a:xfrm>
+            <a:off x="0" y="1115997"/>
+            <a:ext cx="7924800" cy="5742004"/>
+          </a:xfrm>
+          <a:prstGeom prst="rect">
+            <a:avLst/>
+          </a:prstGeom>
+        </p:spPr>
+      </p:pic>
+      <p:sp>
+        <p:nvSpPr>
+          <p:cNvPr id="11" name="TextBox 10">
+            <a:extLst>
+              <a:ext uri="{FF2B5EF4-FFF2-40B4-BE49-F238E27FC236}">
+                <a16:creationId xmlns:a16="http://schemas.microsoft.com/office/drawing/2014/main" id="{642EFF90-7C1C-58D6-DCCB-11AFC53DD141}"/>
+              </a:ext>
+            </a:extLst>
+          </p:cNvPr>
+          <p:cNvSpPr txBox="1"/>
+          <p:nvPr/>
+        </p:nvSpPr>
+        <p:spPr>
+          <a:xfrm>
+            <a:off x="8046720" y="1452880"/>
+            <a:ext cx="4145280" cy="1477328"/>
+          </a:xfrm>
+          <a:prstGeom prst="rect">
+            <a:avLst/>
+          </a:prstGeom>
+          <a:noFill/>
+        </p:spPr>
+        <p:txBody>
+          <a:bodyPr wrap="square" rtlCol="0">
+            <a:spAutoFit/>
+          </a:bodyPr>
+          <a:lstStyle/>
+          <a:p>
+            <a:r>
+              <a:rPr lang="en-US" dirty="0"/>
+              <a:t>From iiyearly2, aggregate results function</a:t>
+            </a:r>
+          </a:p>
+          <a:p>
+            <a:r>
+              <a:rPr lang="en-US" dirty="0"/>
+              <a:t>This is demonstrating the jagged results as well as waste blowing up.</a:t>
+            </a:r>
+          </a:p>
+          <a:p>
+            <a:endParaRPr lang="en-US" dirty="0"/>
+          </a:p>
+          <a:p>
+            <a:r>
+              <a:rPr lang="en-US" dirty="0"/>
+              <a:t>PV ICE waste doesn’t blow up…?</a:t>
+            </a:r>
+          </a:p>
+        </p:txBody>
+      </p:sp>
+    </p:spTree>
+    <p:extLst>
+      <p:ext uri="{BB962C8B-B14F-4D97-AF65-F5344CB8AC3E}">
+        <p14:creationId xmlns:p14="http://schemas.microsoft.com/office/powerpoint/2010/main" val="3844964183"/>
+      </p:ext>
+    </p:extLst>
+  </p:cSld>
+  <p:clrMapOvr>
+    <a:masterClrMapping/>
+  </p:clrMapOvr>
+</p:sld>
+</file>
+
+<file path=ppt/slides/slide14.xml><?xml version="1.0" encoding="utf-8"?>
+<p:sld xmlns:a="http://schemas.openxmlformats.org/drawingml/2006/main" xmlns:r="http://schemas.openxmlformats.org/officeDocument/2006/relationships" xmlns:p="http://schemas.openxmlformats.org/presentationml/2006/main">
+  <p:cSld>
+    <p:spTree>
+      <p:nvGrpSpPr>
+        <p:cNvPr id="1" name=""/>
+        <p:cNvGrpSpPr/>
+        <p:nvPr/>
+      </p:nvGrpSpPr>
+      <p:grpSpPr>
+        <a:xfrm>
+          <a:off x="0" y="0"/>
+          <a:ext cx="0" cy="0"/>
+          <a:chOff x="0" y="0"/>
+          <a:chExt cx="0" cy="0"/>
+        </a:xfrm>
+      </p:grpSpPr>
+      <p:sp>
+        <p:nvSpPr>
+          <p:cNvPr id="2" name="Title 1">
+            <a:extLst>
+              <a:ext uri="{FF2B5EF4-FFF2-40B4-BE49-F238E27FC236}">
+                <a16:creationId xmlns:a16="http://schemas.microsoft.com/office/drawing/2014/main" id="{5DBE12CC-F2A3-C548-A755-B10D0D3F397D}"/>
+              </a:ext>
+            </a:extLst>
+          </p:cNvPr>
+          <p:cNvSpPr>
+            <a:spLocks noGrp="1"/>
+          </p:cNvSpPr>
+          <p:nvPr>
+            <p:ph type="title"/>
+          </p:nvPr>
+        </p:nvSpPr>
+        <p:spPr>
+          <a:xfrm>
+            <a:off x="0" y="0"/>
+            <a:ext cx="10515600" cy="825229"/>
+          </a:xfrm>
+        </p:spPr>
+        <p:txBody>
+          <a:bodyPr/>
+          <a:lstStyle/>
+          <a:p>
+            <a:r>
+              <a:rPr lang="en-US" dirty="0" err="1"/>
+              <a:t>DataOut_m</a:t>
+            </a:r>
+            <a:r>
+              <a:rPr lang="en-US" dirty="0"/>
+              <a:t> shows both jagged and blow up?</a:t>
+            </a:r>
+          </a:p>
+        </p:txBody>
+      </p:sp>
+      <p:pic>
+        <p:nvPicPr>
+          <p:cNvPr id="4" name="Picture 3" descr="A graph with red and green lines&#10;&#10;Description automatically generated with low confidence">
+            <a:extLst>
+              <a:ext uri="{FF2B5EF4-FFF2-40B4-BE49-F238E27FC236}">
+                <a16:creationId xmlns:a16="http://schemas.microsoft.com/office/drawing/2014/main" id="{A422E2E7-E0E3-6258-3EA2-0E98D9248556}"/>
+              </a:ext>
+            </a:extLst>
+          </p:cNvPr>
+          <p:cNvPicPr>
+            <a:picLocks noChangeAspect="1"/>
+          </p:cNvPicPr>
+          <p:nvPr/>
+        </p:nvPicPr>
+        <p:blipFill>
+          <a:blip r:embed="rId2">
+            <a:extLst>
+              <a:ext uri="{28A0092B-C50C-407E-A947-70E740481C1C}">
+                <a14:useLocalDpi xmlns:a14="http://schemas.microsoft.com/office/drawing/2010/main" val="0"/>
+              </a:ext>
+            </a:extLst>
+          </a:blip>
+          <a:stretch>
+            <a:fillRect/>
+          </a:stretch>
+        </p:blipFill>
+        <p:spPr>
+          <a:xfrm>
+            <a:off x="0" y="825229"/>
+            <a:ext cx="8442960" cy="6032772"/>
+          </a:xfrm>
+          <a:prstGeom prst="rect">
+            <a:avLst/>
+          </a:prstGeom>
+        </p:spPr>
+      </p:pic>
+      <p:sp>
+        <p:nvSpPr>
+          <p:cNvPr id="5" name="TextBox 4">
+            <a:extLst>
+              <a:ext uri="{FF2B5EF4-FFF2-40B4-BE49-F238E27FC236}">
+                <a16:creationId xmlns:a16="http://schemas.microsoft.com/office/drawing/2014/main" id="{18A0F606-F313-93EC-72CF-9763D7C2D530}"/>
+              </a:ext>
+            </a:extLst>
+          </p:cNvPr>
+          <p:cNvSpPr txBox="1"/>
+          <p:nvPr/>
+        </p:nvSpPr>
+        <p:spPr>
+          <a:xfrm>
+            <a:off x="8442960" y="1046480"/>
+            <a:ext cx="3749040" cy="646331"/>
+          </a:xfrm>
+          <a:prstGeom prst="rect">
+            <a:avLst/>
+          </a:prstGeom>
+          <a:noFill/>
+        </p:spPr>
+        <p:txBody>
+          <a:bodyPr wrap="square" rtlCol="0">
+            <a:spAutoFit/>
+          </a:bodyPr>
+          <a:lstStyle/>
+          <a:p>
+            <a:r>
+              <a:rPr lang="en-US" dirty="0"/>
+              <a:t>Area disposed by failures and </a:t>
+            </a:r>
+          </a:p>
+          <a:p>
+            <a:r>
+              <a:rPr lang="en-US" dirty="0"/>
+              <a:t>Area disposed by project life</a:t>
+            </a:r>
+          </a:p>
+        </p:txBody>
+      </p:sp>
+    </p:spTree>
+    <p:extLst>
+      <p:ext uri="{BB962C8B-B14F-4D97-AF65-F5344CB8AC3E}">
+        <p14:creationId xmlns:p14="http://schemas.microsoft.com/office/powerpoint/2010/main" val="1672804357"/>
+      </p:ext>
+    </p:extLst>
+  </p:cSld>
+  <p:clrMapOvr>
+    <a:masterClrMapping/>
+  </p:clrMapOvr>
+</p:sld>
+</file>
+
+<file path=ppt/slides/slide15.xml><?xml version="1.0" encoding="utf-8"?>
+<p:sld xmlns:a="http://schemas.openxmlformats.org/drawingml/2006/main" xmlns:r="http://schemas.openxmlformats.org/officeDocument/2006/relationships" xmlns:p="http://schemas.openxmlformats.org/presentationml/2006/main">
+  <p:cSld>
+    <p:spTree>
+      <p:nvGrpSpPr>
+        <p:cNvPr id="1" name=""/>
+        <p:cNvGrpSpPr/>
+        <p:nvPr/>
+      </p:nvGrpSpPr>
+      <p:grpSpPr>
+        <a:xfrm>
+          <a:off x="0" y="0"/>
+          <a:ext cx="0" cy="0"/>
+          <a:chOff x="0" y="0"/>
+          <a:chExt cx="0" cy="0"/>
+        </a:xfrm>
+      </p:grpSpPr>
+      <p:sp>
+        <p:nvSpPr>
+          <p:cNvPr id="4" name="Title 3">
+            <a:extLst>
+              <a:ext uri="{FF2B5EF4-FFF2-40B4-BE49-F238E27FC236}">
+                <a16:creationId xmlns:a16="http://schemas.microsoft.com/office/drawing/2014/main" id="{4A77C9AB-FD8E-1AF1-6ECD-1DC4841AC695}"/>
+              </a:ext>
+            </a:extLst>
+          </p:cNvPr>
+          <p:cNvSpPr>
+            <a:spLocks noGrp="1"/>
+          </p:cNvSpPr>
+          <p:nvPr>
+            <p:ph type="title"/>
+          </p:nvPr>
+        </p:nvSpPr>
+        <p:spPr>
+          <a:xfrm>
+            <a:off x="838200" y="2065338"/>
+            <a:ext cx="10515600" cy="2852737"/>
+          </a:xfrm>
+        </p:spPr>
+        <p:txBody>
+          <a:bodyPr/>
+          <a:lstStyle/>
+          <a:p>
+            <a:r>
+              <a:rPr lang="en-US" dirty="0"/>
+              <a:t>Remove the Trim year extension</a:t>
+            </a:r>
+          </a:p>
+        </p:txBody>
+      </p:sp>
+      <p:sp>
+        <p:nvSpPr>
+          <p:cNvPr id="5" name="Text Placeholder 4">
+            <a:extLst>
+              <a:ext uri="{FF2B5EF4-FFF2-40B4-BE49-F238E27FC236}">
+                <a16:creationId xmlns:a16="http://schemas.microsoft.com/office/drawing/2014/main" id="{1F8CFB7E-CE5B-B6BD-2E76-D132EB6460CC}"/>
+              </a:ext>
+            </a:extLst>
+          </p:cNvPr>
+          <p:cNvSpPr>
+            <a:spLocks noGrp="1"/>
+          </p:cNvSpPr>
+          <p:nvPr>
+            <p:ph type="body" idx="1"/>
+          </p:nvPr>
+        </p:nvSpPr>
+        <p:spPr>
+          <a:xfrm>
+            <a:off x="838200" y="4945063"/>
+            <a:ext cx="10515600" cy="1500187"/>
+          </a:xfrm>
+        </p:spPr>
+        <p:txBody>
+          <a:bodyPr/>
+          <a:lstStyle/>
+          <a:p>
+            <a:r>
+              <a:rPr lang="en-US" dirty="0"/>
+              <a:t>Did not use trim years to extend the simulation</a:t>
+            </a:r>
+          </a:p>
+          <a:p>
+            <a:r>
+              <a:rPr lang="en-US" dirty="0"/>
+              <a:t>Use global projection through 2050</a:t>
+            </a:r>
+          </a:p>
+        </p:txBody>
+      </p:sp>
+      <p:pic>
+        <p:nvPicPr>
+          <p:cNvPr id="3" name="Picture 2" descr="A picture containing text, screenshot, plot, diagram&#10;&#10;Description automatically generated">
+            <a:extLst>
+              <a:ext uri="{FF2B5EF4-FFF2-40B4-BE49-F238E27FC236}">
+                <a16:creationId xmlns:a16="http://schemas.microsoft.com/office/drawing/2014/main" id="{ABA1E211-A53D-07BE-5767-EE874A2F3B30}"/>
+              </a:ext>
+            </a:extLst>
+          </p:cNvPr>
+          <p:cNvPicPr>
+            <a:picLocks noChangeAspect="1"/>
+          </p:cNvPicPr>
+          <p:nvPr/>
+        </p:nvPicPr>
+        <p:blipFill>
+          <a:blip r:embed="rId2">
+            <a:extLst>
+              <a:ext uri="{28A0092B-C50C-407E-A947-70E740481C1C}">
+                <a14:useLocalDpi xmlns:a14="http://schemas.microsoft.com/office/drawing/2010/main" val="0"/>
+              </a:ext>
+            </a:extLst>
+          </a:blip>
+          <a:stretch>
+            <a:fillRect/>
+          </a:stretch>
+        </p:blipFill>
+        <p:spPr>
+          <a:xfrm>
+            <a:off x="7043918" y="58670"/>
+            <a:ext cx="5148082" cy="3959360"/>
+          </a:xfrm>
+          <a:prstGeom prst="rect">
+            <a:avLst/>
+          </a:prstGeom>
+        </p:spPr>
+      </p:pic>
+    </p:spTree>
+    <p:extLst>
+      <p:ext uri="{BB962C8B-B14F-4D97-AF65-F5344CB8AC3E}">
+        <p14:creationId xmlns:p14="http://schemas.microsoft.com/office/powerpoint/2010/main" val="597274756"/>
+      </p:ext>
+    </p:extLst>
+  </p:cSld>
+  <p:clrMapOvr>
+    <a:masterClrMapping/>
+  </p:clrMapOvr>
+</p:sld>
+</file>
+
+<file path=ppt/slides/slide16.xml><?xml version="1.0" encoding="utf-8"?>
+<p:sld xmlns:a="http://schemas.openxmlformats.org/drawingml/2006/main" xmlns:r="http://schemas.openxmlformats.org/officeDocument/2006/relationships" xmlns:p="http://schemas.openxmlformats.org/presentationml/2006/main">
+  <p:cSld>
+    <p:spTree>
+      <p:nvGrpSpPr>
+        <p:cNvPr id="1" name=""/>
+        <p:cNvGrpSpPr/>
+        <p:nvPr/>
+      </p:nvGrpSpPr>
+      <p:grpSpPr>
+        <a:xfrm>
+          <a:off x="0" y="0"/>
+          <a:ext cx="0" cy="0"/>
+          <a:chOff x="0" y="0"/>
+          <a:chExt cx="0" cy="0"/>
+        </a:xfrm>
+      </p:grpSpPr>
+      <p:sp>
+        <p:nvSpPr>
+          <p:cNvPr id="6" name="Title 5">
+            <a:extLst>
+              <a:ext uri="{FF2B5EF4-FFF2-40B4-BE49-F238E27FC236}">
+                <a16:creationId xmlns:a16="http://schemas.microsoft.com/office/drawing/2014/main" id="{7C660CCF-2A48-B1FA-67BA-82A1045AE1EE}"/>
+              </a:ext>
+            </a:extLst>
+          </p:cNvPr>
+          <p:cNvSpPr>
+            <a:spLocks noGrp="1"/>
+          </p:cNvSpPr>
+          <p:nvPr>
+            <p:ph type="title"/>
+          </p:nvPr>
+        </p:nvSpPr>
+        <p:spPr>
+          <a:xfrm>
+            <a:off x="0" y="1"/>
+            <a:ext cx="9408160" cy="1110858"/>
+          </a:xfrm>
+        </p:spPr>
+        <p:txBody>
+          <a:bodyPr>
             <a:normAutofit/>
           </a:bodyPr>
           <a:lstStyle/>
@@ -4003,7 +4331,7 @@
 </p:sld>
 </file>
 
-<file path=ppt/slides/slide14.xml><?xml version="1.0" encoding="utf-8"?>
+<file path=ppt/slides/slide17.xml><?xml version="1.0" encoding="utf-8"?>
 <p:sld xmlns:a="http://schemas.openxmlformats.org/drawingml/2006/main" xmlns:r="http://schemas.openxmlformats.org/officeDocument/2006/relationships" xmlns:p="http://schemas.openxmlformats.org/presentationml/2006/main">
   <p:cSld>
     <p:spTree>
@@ -5739,7 +6067,7 @@
         <p:spPr>
           <a:xfrm>
             <a:off x="0" y="18255"/>
-            <a:ext cx="10515600" cy="1325563"/>
+            <a:ext cx="10515600" cy="716851"/>
           </a:xfrm>
         </p:spPr>
         <p:txBody>
@@ -5754,6 +6082,78 @@
           </a:p>
         </p:txBody>
       </p:sp>
+      <p:pic>
+        <p:nvPicPr>
+          <p:cNvPr id="4" name="Picture 3" descr="A picture containing text, screenshot, diagram, line&#10;&#10;Description automatically generated">
+            <a:extLst>
+              <a:ext uri="{FF2B5EF4-FFF2-40B4-BE49-F238E27FC236}">
+                <a16:creationId xmlns:a16="http://schemas.microsoft.com/office/drawing/2014/main" id="{A3C147C9-2A46-718E-6B79-F917DA92FAA5}"/>
+              </a:ext>
+            </a:extLst>
+          </p:cNvPr>
+          <p:cNvPicPr>
+            <a:picLocks noChangeAspect="1"/>
+          </p:cNvPicPr>
+          <p:nvPr/>
+        </p:nvPicPr>
+        <p:blipFill>
+          <a:blip r:embed="rId2">
+            <a:extLst>
+              <a:ext uri="{28A0092B-C50C-407E-A947-70E740481C1C}">
+                <a14:useLocalDpi xmlns:a14="http://schemas.microsoft.com/office/drawing/2010/main" val="0"/>
+              </a:ext>
+            </a:extLst>
+          </a:blip>
+          <a:stretch>
+            <a:fillRect/>
+          </a:stretch>
+        </p:blipFill>
+        <p:spPr>
+          <a:xfrm>
+            <a:off x="0" y="735106"/>
+            <a:ext cx="5001778" cy="3959360"/>
+          </a:xfrm>
+          <a:prstGeom prst="rect">
+            <a:avLst/>
+          </a:prstGeom>
+        </p:spPr>
+      </p:pic>
+      <p:pic>
+        <p:nvPicPr>
+          <p:cNvPr id="6" name="Picture 5" descr="A picture containing text, screenshot, diagram, plot&#10;&#10;Description automatically generated">
+            <a:extLst>
+              <a:ext uri="{FF2B5EF4-FFF2-40B4-BE49-F238E27FC236}">
+                <a16:creationId xmlns:a16="http://schemas.microsoft.com/office/drawing/2014/main" id="{D149FF42-AD75-4B2C-0055-90E08B31BD30}"/>
+              </a:ext>
+            </a:extLst>
+          </p:cNvPr>
+          <p:cNvPicPr>
+            <a:picLocks noChangeAspect="1"/>
+          </p:cNvPicPr>
+          <p:nvPr/>
+        </p:nvPicPr>
+        <p:blipFill>
+          <a:blip r:embed="rId3">
+            <a:extLst>
+              <a:ext uri="{28A0092B-C50C-407E-A947-70E740481C1C}">
+                <a14:useLocalDpi xmlns:a14="http://schemas.microsoft.com/office/drawing/2010/main" val="0"/>
+              </a:ext>
+            </a:extLst>
+          </a:blip>
+          <a:stretch>
+            <a:fillRect/>
+          </a:stretch>
+        </p:blipFill>
+        <p:spPr>
+          <a:xfrm>
+            <a:off x="5019708" y="735106"/>
+            <a:ext cx="5001778" cy="3959360"/>
+          </a:xfrm>
+          <a:prstGeom prst="rect">
+            <a:avLst/>
+          </a:prstGeom>
+        </p:spPr>
+      </p:pic>
     </p:spTree>
     <p:extLst>
       <p:ext uri="{BB962C8B-B14F-4D97-AF65-F5344CB8AC3E}">
@@ -5784,84 +6184,12 @@
           <a:chExt cx="0" cy="0"/>
         </a:xfrm>
       </p:grpSpPr>
-      <p:sp>
-        <p:nvSpPr>
-          <p:cNvPr id="4" name="Title 3">
-            <a:extLst>
-              <a:ext uri="{FF2B5EF4-FFF2-40B4-BE49-F238E27FC236}">
-                <a16:creationId xmlns:a16="http://schemas.microsoft.com/office/drawing/2014/main" id="{4A77C9AB-FD8E-1AF1-6ECD-1DC4841AC695}"/>
-              </a:ext>
-            </a:extLst>
-          </p:cNvPr>
-          <p:cNvSpPr>
-            <a:spLocks noGrp="1"/>
-          </p:cNvSpPr>
-          <p:nvPr>
-            <p:ph type="title"/>
-          </p:nvPr>
-        </p:nvSpPr>
-        <p:spPr>
-          <a:xfrm>
-            <a:off x="838200" y="2065338"/>
-            <a:ext cx="10515600" cy="2852737"/>
-          </a:xfrm>
-        </p:spPr>
-        <p:txBody>
-          <a:bodyPr/>
-          <a:lstStyle/>
-          <a:p>
-            <a:r>
-              <a:rPr lang="en-US" dirty="0"/>
-              <a:t>Remove the Trim year extension</a:t>
-            </a:r>
-          </a:p>
-        </p:txBody>
-      </p:sp>
-      <p:sp>
-        <p:nvSpPr>
-          <p:cNvPr id="5" name="Text Placeholder 4">
-            <a:extLst>
-              <a:ext uri="{FF2B5EF4-FFF2-40B4-BE49-F238E27FC236}">
-                <a16:creationId xmlns:a16="http://schemas.microsoft.com/office/drawing/2014/main" id="{1F8CFB7E-CE5B-B6BD-2E76-D132EB6460CC}"/>
-              </a:ext>
-            </a:extLst>
-          </p:cNvPr>
-          <p:cNvSpPr>
-            <a:spLocks noGrp="1"/>
-          </p:cNvSpPr>
-          <p:nvPr>
-            <p:ph type="body" idx="1"/>
-          </p:nvPr>
-        </p:nvSpPr>
-        <p:spPr>
-          <a:xfrm>
-            <a:off x="838200" y="4945063"/>
-            <a:ext cx="10515600" cy="1500187"/>
-          </a:xfrm>
-        </p:spPr>
-        <p:txBody>
-          <a:bodyPr/>
-          <a:lstStyle/>
-          <a:p>
-            <a:r>
-              <a:rPr lang="en-US" dirty="0"/>
-              <a:t>Did not use trim years to extend the simulation</a:t>
-            </a:r>
-          </a:p>
-          <a:p>
-            <a:r>
-              <a:rPr lang="en-US" dirty="0"/>
-              <a:t>Used a 100.0 MW annual install</a:t>
-            </a:r>
-          </a:p>
-        </p:txBody>
-      </p:sp>
       <p:pic>
         <p:nvPicPr>
-          <p:cNvPr id="7" name="Picture 6" descr="A picture containing text, screenshot, line, plot&#10;&#10;Description automatically generated">
-            <a:extLst>
-              <a:ext uri="{FF2B5EF4-FFF2-40B4-BE49-F238E27FC236}">
-                <a16:creationId xmlns:a16="http://schemas.microsoft.com/office/drawing/2014/main" id="{AA1485AC-8F57-2EFC-CDAD-ED3F3DC4F05A}"/>
+          <p:cNvPr id="5" name="Picture 4">
+            <a:extLst>
+              <a:ext uri="{FF2B5EF4-FFF2-40B4-BE49-F238E27FC236}">
+                <a16:creationId xmlns:a16="http://schemas.microsoft.com/office/drawing/2014/main" id="{28509F99-3CB1-11D2-C5B5-CBFCA186D1BA}"/>
               </a:ext>
             </a:extLst>
           </p:cNvPr>
@@ -5871,31 +6199,90 @@
           <p:nvPr/>
         </p:nvPicPr>
         <p:blipFill>
-          <a:blip r:embed="rId2">
-            <a:extLst>
-              <a:ext uri="{28A0092B-C50C-407E-A947-70E740481C1C}">
-                <a14:useLocalDpi xmlns:a14="http://schemas.microsoft.com/office/drawing/2010/main" val="0"/>
-              </a:ext>
-            </a:extLst>
-          </a:blip>
+          <a:blip r:embed="rId2"/>
           <a:stretch>
             <a:fillRect/>
           </a:stretch>
         </p:blipFill>
         <p:spPr>
           <a:xfrm>
-            <a:off x="6842749" y="0"/>
-            <a:ext cx="5349251" cy="3959360"/>
+            <a:off x="0" y="1208690"/>
+            <a:ext cx="7703605" cy="5649310"/>
           </a:xfrm>
           <a:prstGeom prst="rect">
             <a:avLst/>
           </a:prstGeom>
         </p:spPr>
       </p:pic>
+      <p:pic>
+        <p:nvPicPr>
+          <p:cNvPr id="6" name="Picture 5">
+            <a:extLst>
+              <a:ext uri="{FF2B5EF4-FFF2-40B4-BE49-F238E27FC236}">
+                <a16:creationId xmlns:a16="http://schemas.microsoft.com/office/drawing/2014/main" id="{15A1EB31-E1D0-371C-EFB7-5208175B825A}"/>
+              </a:ext>
+            </a:extLst>
+          </p:cNvPr>
+          <p:cNvPicPr>
+            <a:picLocks noChangeAspect="1"/>
+          </p:cNvPicPr>
+          <p:nvPr/>
+        </p:nvPicPr>
+        <p:blipFill>
+          <a:blip r:embed="rId3"/>
+          <a:stretch>
+            <a:fillRect/>
+          </a:stretch>
+        </p:blipFill>
+        <p:spPr>
+          <a:xfrm>
+            <a:off x="6188396" y="1208690"/>
+            <a:ext cx="6003604" cy="4399556"/>
+          </a:xfrm>
+          <a:prstGeom prst="rect">
+            <a:avLst/>
+          </a:prstGeom>
+        </p:spPr>
+      </p:pic>
+      <p:sp>
+        <p:nvSpPr>
+          <p:cNvPr id="4" name="Title 3">
+            <a:extLst>
+              <a:ext uri="{FF2B5EF4-FFF2-40B4-BE49-F238E27FC236}">
+                <a16:creationId xmlns:a16="http://schemas.microsoft.com/office/drawing/2014/main" id="{362E7FA4-E5A5-A28E-A90A-22D0AE7A106F}"/>
+              </a:ext>
+            </a:extLst>
+          </p:cNvPr>
+          <p:cNvSpPr>
+            <a:spLocks noGrp="1"/>
+          </p:cNvSpPr>
+          <p:nvPr>
+            <p:ph type="title"/>
+          </p:nvPr>
+        </p:nvSpPr>
+        <p:spPr>
+          <a:xfrm>
+            <a:off x="0" y="0"/>
+            <a:ext cx="12192000" cy="851337"/>
+          </a:xfrm>
+        </p:spPr>
+        <p:txBody>
+          <a:bodyPr>
+            <a:normAutofit fontScale="90000"/>
+          </a:bodyPr>
+          <a:lstStyle/>
+          <a:p>
+            <a:r>
+              <a:rPr lang="en-US" dirty="0"/>
+              <a:t>EOL L0 – the end of life on year ## is possibly cumulative??</a:t>
+            </a:r>
+          </a:p>
+        </p:txBody>
+      </p:sp>
     </p:spTree>
     <p:extLst>
       <p:ext uri="{BB962C8B-B14F-4D97-AF65-F5344CB8AC3E}">
-        <p14:creationId xmlns:p14="http://schemas.microsoft.com/office/powerpoint/2010/main" val="2196573499"/>
+        <p14:creationId xmlns:p14="http://schemas.microsoft.com/office/powerpoint/2010/main" val="2230565327"/>
       </p:ext>
     </p:extLst>
   </p:cSld>

</xml_diff>

<commit_message>
debug - check nonirena files
non-irena files do not blow up waste, but do have jagged EoL_life
</commit_message>
<xml_diff>
--- a/PV_ICE/baselines/Energy_CellModuleTechCompare/DEBUGIRENA.pptx
+++ b/PV_ICE/baselines/Energy_CellModuleTechCompare/DEBUGIRENA.pptx
@@ -16,12 +16,14 @@
     <p:sldId id="270" r:id="rId10"/>
     <p:sldId id="271" r:id="rId11"/>
     <p:sldId id="272" r:id="rId12"/>
-    <p:sldId id="263" r:id="rId13"/>
-    <p:sldId id="264" r:id="rId14"/>
-    <p:sldId id="265" r:id="rId15"/>
-    <p:sldId id="266" r:id="rId16"/>
-    <p:sldId id="267" r:id="rId17"/>
-    <p:sldId id="268" r:id="rId18"/>
+    <p:sldId id="273" r:id="rId13"/>
+    <p:sldId id="274" r:id="rId14"/>
+    <p:sldId id="263" r:id="rId15"/>
+    <p:sldId id="264" r:id="rId16"/>
+    <p:sldId id="265" r:id="rId17"/>
+    <p:sldId id="266" r:id="rId18"/>
+    <p:sldId id="267" r:id="rId19"/>
+    <p:sldId id="268" r:id="rId20"/>
   </p:sldIdLst>
   <p:sldSz cx="12192000" cy="6858000"/>
   <p:notesSz cx="6858000" cy="9144000"/>
@@ -3545,10 +3547,10 @@
       </p:grpSpPr>
       <p:sp>
         <p:nvSpPr>
-          <p:cNvPr id="2" name="Title 1">
-            <a:extLst>
-              <a:ext uri="{FF2B5EF4-FFF2-40B4-BE49-F238E27FC236}">
-                <a16:creationId xmlns:a16="http://schemas.microsoft.com/office/drawing/2014/main" id="{6DC6C4FF-A876-632C-57BE-8996BFD391F6}"/>
+          <p:cNvPr id="3" name="Title 2">
+            <a:extLst>
+              <a:ext uri="{FF2B5EF4-FFF2-40B4-BE49-F238E27FC236}">
+                <a16:creationId xmlns:a16="http://schemas.microsoft.com/office/drawing/2014/main" id="{6B10C0E6-D06D-CC4C-C96A-A70CAF601D2F}"/>
               </a:ext>
             </a:extLst>
           </p:cNvPr>
@@ -3564,10 +3566,83 @@
           <a:bodyPr/>
           <a:lstStyle/>
           <a:p>
-            <a:endParaRPr lang="en-US"/>
-          </a:p>
-        </p:txBody>
-      </p:sp>
+            <a:r>
+              <a:rPr lang="en-US" dirty="0"/>
+              <a:t>Check non-IRENA module files</a:t>
+            </a:r>
+          </a:p>
+        </p:txBody>
+      </p:sp>
+      <p:sp>
+        <p:nvSpPr>
+          <p:cNvPr id="4" name="Text Placeholder 3">
+            <a:extLst>
+              <a:ext uri="{FF2B5EF4-FFF2-40B4-BE49-F238E27FC236}">
+                <a16:creationId xmlns:a16="http://schemas.microsoft.com/office/drawing/2014/main" id="{F366214E-7826-45B3-90F9-8085BC579E6C}"/>
+              </a:ext>
+            </a:extLst>
+          </p:cNvPr>
+          <p:cNvSpPr>
+            <a:spLocks noGrp="1"/>
+          </p:cNvSpPr>
+          <p:nvPr>
+            <p:ph type="body" idx="1"/>
+          </p:nvPr>
+        </p:nvSpPr>
+        <p:spPr/>
+        <p:txBody>
+          <a:bodyPr/>
+          <a:lstStyle/>
+          <a:p>
+            <a:r>
+              <a:rPr lang="en-US" dirty="0"/>
+              <a:t>Ran with PERC</a:t>
+            </a:r>
+          </a:p>
+          <a:p>
+            <a:r>
+              <a:rPr lang="en-US" dirty="0"/>
+              <a:t>Didn’t modify materials, just modules</a:t>
+            </a:r>
+          </a:p>
+        </p:txBody>
+      </p:sp>
+      <p:pic>
+        <p:nvPicPr>
+          <p:cNvPr id="6" name="Picture 5" descr="A picture containing text, diagram, line, plot&#10;&#10;Description automatically generated">
+            <a:extLst>
+              <a:ext uri="{FF2B5EF4-FFF2-40B4-BE49-F238E27FC236}">
+                <a16:creationId xmlns:a16="http://schemas.microsoft.com/office/drawing/2014/main" id="{D02340FA-5C4B-FFA5-9CB3-27E76E9B5C44}"/>
+              </a:ext>
+            </a:extLst>
+          </p:cNvPr>
+          <p:cNvPicPr>
+            <a:picLocks noChangeAspect="1"/>
+          </p:cNvPicPr>
+          <p:nvPr/>
+        </p:nvPicPr>
+        <p:blipFill>
+          <a:blip r:embed="rId2">
+            <a:extLst>
+              <a:ext uri="{28A0092B-C50C-407E-A947-70E740481C1C}">
+                <a14:useLocalDpi xmlns:a14="http://schemas.microsoft.com/office/drawing/2010/main" val="0"/>
+              </a:ext>
+            </a:extLst>
+          </a:blip>
+          <a:stretch>
+            <a:fillRect/>
+          </a:stretch>
+        </p:blipFill>
+        <p:spPr>
+          <a:xfrm>
+            <a:off x="7440706" y="0"/>
+            <a:ext cx="4751294" cy="3654193"/>
+          </a:xfrm>
+          <a:prstGeom prst="rect">
+            <a:avLst/>
+          </a:prstGeom>
+        </p:spPr>
+      </p:pic>
     </p:spTree>
     <p:extLst>
       <p:ext uri="{BB962C8B-B14F-4D97-AF65-F5344CB8AC3E}">
@@ -3603,7 +3678,7 @@
           <p:cNvPr id="4" name="Title 3">
             <a:extLst>
               <a:ext uri="{FF2B5EF4-FFF2-40B4-BE49-F238E27FC236}">
-                <a16:creationId xmlns:a16="http://schemas.microsoft.com/office/drawing/2014/main" id="{4A77C9AB-FD8E-1AF1-6ECD-1DC4841AC695}"/>
+                <a16:creationId xmlns:a16="http://schemas.microsoft.com/office/drawing/2014/main" id="{A2102918-44B4-7E33-622E-259C6CBB4D3A}"/>
               </a:ext>
             </a:extLst>
           </p:cNvPr>
@@ -3616,50 +3691,8 @@
         </p:nvSpPr>
         <p:spPr>
           <a:xfrm>
-            <a:off x="0" y="2246856"/>
-            <a:ext cx="10515600" cy="2916555"/>
-          </a:xfrm>
-        </p:spPr>
-        <p:txBody>
-          <a:bodyPr>
-            <a:normAutofit/>
-          </a:bodyPr>
-          <a:lstStyle/>
-          <a:p>
-            <a:r>
-              <a:rPr lang="en-US" sz="9600" dirty="0"/>
-              <a:t>Remove Trim</a:t>
-            </a:r>
-            <a:br>
-              <a:rPr lang="en-US" sz="9600" dirty="0"/>
-            </a:br>
-            <a:r>
-              <a:rPr lang="en-US" sz="9600" dirty="0"/>
-              <a:t> year extension</a:t>
-            </a:r>
-          </a:p>
-        </p:txBody>
-      </p:sp>
-      <p:sp>
-        <p:nvSpPr>
-          <p:cNvPr id="5" name="Text Placeholder 4">
-            <a:extLst>
-              <a:ext uri="{FF2B5EF4-FFF2-40B4-BE49-F238E27FC236}">
-                <a16:creationId xmlns:a16="http://schemas.microsoft.com/office/drawing/2014/main" id="{1F8CFB7E-CE5B-B6BD-2E76-D132EB6460CC}"/>
-              </a:ext>
-            </a:extLst>
-          </p:cNvPr>
-          <p:cNvSpPr>
-            <a:spLocks noGrp="1"/>
-          </p:cNvSpPr>
-          <p:nvPr>
-            <p:ph type="body" idx="1"/>
-          </p:nvPr>
-        </p:nvSpPr>
-        <p:spPr>
-          <a:xfrm>
-            <a:off x="838200" y="4945063"/>
-            <a:ext cx="10515600" cy="1500187"/>
+            <a:off x="0" y="0"/>
+            <a:ext cx="10515600" cy="1325563"/>
           </a:xfrm>
         </p:spPr>
         <p:txBody>
@@ -3667,24 +3700,22 @@
           <a:lstStyle/>
           <a:p>
             <a:r>
-              <a:rPr lang="en-US" dirty="0"/>
-              <a:t>Did not use trim years to extend the simulation</a:t>
-            </a:r>
-          </a:p>
-          <a:p>
-            <a:r>
-              <a:rPr lang="en-US" dirty="0"/>
-              <a:t>Used a 100.0 MW annual install</a:t>
+              <a:rPr lang="en-US" dirty="0" err="1"/>
+              <a:t>r_PERC</a:t>
+            </a:r>
+            <a:r>
+              <a:rPr lang="en-US" dirty="0"/>
+              <a:t> shows jagged, but not blow up</a:t>
             </a:r>
           </a:p>
         </p:txBody>
       </p:sp>
       <p:pic>
         <p:nvPicPr>
-          <p:cNvPr id="7" name="Picture 6" descr="A picture containing text, screenshot, line, plot&#10;&#10;Description automatically generated">
-            <a:extLst>
-              <a:ext uri="{FF2B5EF4-FFF2-40B4-BE49-F238E27FC236}">
-                <a16:creationId xmlns:a16="http://schemas.microsoft.com/office/drawing/2014/main" id="{AA1485AC-8F57-2EFC-CDAD-ED3F3DC4F05A}"/>
+          <p:cNvPr id="8" name="Picture 7" descr="A picture containing text, screenshot, diagram, plot&#10;&#10;Description automatically generated">
+            <a:extLst>
+              <a:ext uri="{FF2B5EF4-FFF2-40B4-BE49-F238E27FC236}">
+                <a16:creationId xmlns:a16="http://schemas.microsoft.com/office/drawing/2014/main" id="{BB66E12C-C964-A793-FBA4-D18CCBE2C7A9}"/>
               </a:ext>
             </a:extLst>
           </p:cNvPr>
@@ -3707,8 +3738,8 @@
         </p:blipFill>
         <p:spPr>
           <a:xfrm>
-            <a:off x="6842749" y="0"/>
-            <a:ext cx="5349251" cy="3959360"/>
+            <a:off x="0" y="1281733"/>
+            <a:ext cx="7126677" cy="5576267"/>
           </a:xfrm>
           <a:prstGeom prst="rect">
             <a:avLst/>
@@ -3718,7 +3749,7 @@
     </p:spTree>
     <p:extLst>
       <p:ext uri="{BB962C8B-B14F-4D97-AF65-F5344CB8AC3E}">
-        <p14:creationId xmlns:p14="http://schemas.microsoft.com/office/powerpoint/2010/main" val="2196573499"/>
+        <p14:creationId xmlns:p14="http://schemas.microsoft.com/office/powerpoint/2010/main" val="2834690663"/>
       </p:ext>
     </p:extLst>
   </p:cSld>
@@ -3747,10 +3778,10 @@
       </p:grpSpPr>
       <p:sp>
         <p:nvSpPr>
-          <p:cNvPr id="6" name="Title 5">
-            <a:extLst>
-              <a:ext uri="{FF2B5EF4-FFF2-40B4-BE49-F238E27FC236}">
-                <a16:creationId xmlns:a16="http://schemas.microsoft.com/office/drawing/2014/main" id="{7C660CCF-2A48-B1FA-67BA-82A1045AE1EE}"/>
+          <p:cNvPr id="2" name="Title 1">
+            <a:extLst>
+              <a:ext uri="{FF2B5EF4-FFF2-40B4-BE49-F238E27FC236}">
+                <a16:creationId xmlns:a16="http://schemas.microsoft.com/office/drawing/2014/main" id="{17E29421-A336-9F2D-630D-C8C2A6CA5A82}"/>
               </a:ext>
             </a:extLst>
           </p:cNvPr>
@@ -3763,29 +3794,39 @@
         </p:nvSpPr>
         <p:spPr>
           <a:xfrm>
-            <a:off x="0" y="1"/>
-            <a:ext cx="9408160" cy="1110858"/>
-          </a:xfrm>
-        </p:spPr>
-        <p:txBody>
-          <a:bodyPr>
-            <a:normAutofit fontScale="90000"/>
-          </a:bodyPr>
-          <a:lstStyle/>
-          <a:p>
-            <a:r>
-              <a:rPr lang="en-US" dirty="0"/>
-              <a:t>Aggregate Results, both jagged and blow up</a:t>
-            </a:r>
+            <a:off x="0" y="0"/>
+            <a:ext cx="10515600" cy="1325563"/>
+          </a:xfrm>
+        </p:spPr>
+        <p:txBody>
+          <a:bodyPr/>
+          <a:lstStyle/>
+          <a:p>
+            <a:r>
+              <a:rPr lang="en-US" dirty="0"/>
+              <a:t>Data out yearly sums still look ok, </a:t>
+            </a:r>
+            <a:br>
+              <a:rPr lang="en-US" dirty="0"/>
+            </a:br>
+            <a:r>
+              <a:rPr lang="en-US" dirty="0"/>
+              <a:t>except for jagged </a:t>
+            </a:r>
+            <a:r>
+              <a:rPr lang="en-US" dirty="0" err="1"/>
+              <a:t>r_PERC</a:t>
+            </a:r>
+            <a:endParaRPr lang="en-US" dirty="0"/>
           </a:p>
         </p:txBody>
       </p:sp>
       <p:pic>
         <p:nvPicPr>
-          <p:cNvPr id="10" name="Picture 9" descr="A picture containing text, diagram, plot, line&#10;&#10;Description automatically generated">
-            <a:extLst>
-              <a:ext uri="{FF2B5EF4-FFF2-40B4-BE49-F238E27FC236}">
-                <a16:creationId xmlns:a16="http://schemas.microsoft.com/office/drawing/2014/main" id="{A1E4679B-20A2-016C-01AA-883BE7FD2355}"/>
+          <p:cNvPr id="4" name="Picture 3" descr="A picture containing text, line, screenshot, plot&#10;&#10;Description automatically generated">
+            <a:extLst>
+              <a:ext uri="{FF2B5EF4-FFF2-40B4-BE49-F238E27FC236}">
+                <a16:creationId xmlns:a16="http://schemas.microsoft.com/office/drawing/2014/main" id="{88A81187-04FC-81C0-40B3-E517ACBE8F98}"/>
               </a:ext>
             </a:extLst>
           </p:cNvPr>
@@ -3808,68 +3849,18 @@
         </p:blipFill>
         <p:spPr>
           <a:xfrm>
-            <a:off x="0" y="1115997"/>
-            <a:ext cx="7924800" cy="5742004"/>
+            <a:off x="75657" y="1257510"/>
+            <a:ext cx="7275402" cy="5600490"/>
           </a:xfrm>
           <a:prstGeom prst="rect">
             <a:avLst/>
           </a:prstGeom>
         </p:spPr>
       </p:pic>
-      <p:sp>
-        <p:nvSpPr>
-          <p:cNvPr id="11" name="TextBox 10">
-            <a:extLst>
-              <a:ext uri="{FF2B5EF4-FFF2-40B4-BE49-F238E27FC236}">
-                <a16:creationId xmlns:a16="http://schemas.microsoft.com/office/drawing/2014/main" id="{642EFF90-7C1C-58D6-DCCB-11AFC53DD141}"/>
-              </a:ext>
-            </a:extLst>
-          </p:cNvPr>
-          <p:cNvSpPr txBox="1"/>
-          <p:nvPr/>
-        </p:nvSpPr>
-        <p:spPr>
-          <a:xfrm>
-            <a:off x="8046720" y="1452880"/>
-            <a:ext cx="4145280" cy="1477328"/>
-          </a:xfrm>
-          <a:prstGeom prst="rect">
-            <a:avLst/>
-          </a:prstGeom>
-          <a:noFill/>
-        </p:spPr>
-        <p:txBody>
-          <a:bodyPr wrap="square" rtlCol="0">
-            <a:spAutoFit/>
-          </a:bodyPr>
-          <a:lstStyle/>
-          <a:p>
-            <a:r>
-              <a:rPr lang="en-US" dirty="0"/>
-              <a:t>From iiyearly2, aggregate results function</a:t>
-            </a:r>
-          </a:p>
-          <a:p>
-            <a:r>
-              <a:rPr lang="en-US" dirty="0"/>
-              <a:t>This is demonstrating the jagged results as well as waste blowing up.</a:t>
-            </a:r>
-          </a:p>
-          <a:p>
-            <a:endParaRPr lang="en-US" dirty="0"/>
-          </a:p>
-          <a:p>
-            <a:r>
-              <a:rPr lang="en-US" dirty="0"/>
-              <a:t>PV ICE waste doesn’t blow up…?</a:t>
-            </a:r>
-          </a:p>
-        </p:txBody>
-      </p:sp>
     </p:spTree>
     <p:extLst>
       <p:ext uri="{BB962C8B-B14F-4D97-AF65-F5344CB8AC3E}">
-        <p14:creationId xmlns:p14="http://schemas.microsoft.com/office/powerpoint/2010/main" val="3844964183"/>
+        <p14:creationId xmlns:p14="http://schemas.microsoft.com/office/powerpoint/2010/main" val="129884001"/>
       </p:ext>
     </p:extLst>
   </p:cSld>
@@ -3898,10 +3889,10 @@
       </p:grpSpPr>
       <p:sp>
         <p:nvSpPr>
-          <p:cNvPr id="2" name="Title 1">
-            <a:extLst>
-              <a:ext uri="{FF2B5EF4-FFF2-40B4-BE49-F238E27FC236}">
-                <a16:creationId xmlns:a16="http://schemas.microsoft.com/office/drawing/2014/main" id="{5DBE12CC-F2A3-C548-A755-B10D0D3F397D}"/>
+          <p:cNvPr id="4" name="Title 3">
+            <a:extLst>
+              <a:ext uri="{FF2B5EF4-FFF2-40B4-BE49-F238E27FC236}">
+                <a16:creationId xmlns:a16="http://schemas.microsoft.com/office/drawing/2014/main" id="{4A77C9AB-FD8E-1AF1-6ECD-1DC4841AC695}"/>
               </a:ext>
             </a:extLst>
           </p:cNvPr>
@@ -3914,8 +3905,50 @@
         </p:nvSpPr>
         <p:spPr>
           <a:xfrm>
-            <a:off x="0" y="0"/>
-            <a:ext cx="10515600" cy="825229"/>
+            <a:off x="0" y="2246856"/>
+            <a:ext cx="10515600" cy="2916555"/>
+          </a:xfrm>
+        </p:spPr>
+        <p:txBody>
+          <a:bodyPr>
+            <a:normAutofit/>
+          </a:bodyPr>
+          <a:lstStyle/>
+          <a:p>
+            <a:r>
+              <a:rPr lang="en-US" sz="9600" dirty="0"/>
+              <a:t>Remove Trim</a:t>
+            </a:r>
+            <a:br>
+              <a:rPr lang="en-US" sz="9600" dirty="0"/>
+            </a:br>
+            <a:r>
+              <a:rPr lang="en-US" sz="9600" dirty="0"/>
+              <a:t> year extension</a:t>
+            </a:r>
+          </a:p>
+        </p:txBody>
+      </p:sp>
+      <p:sp>
+        <p:nvSpPr>
+          <p:cNvPr id="5" name="Text Placeholder 4">
+            <a:extLst>
+              <a:ext uri="{FF2B5EF4-FFF2-40B4-BE49-F238E27FC236}">
+                <a16:creationId xmlns:a16="http://schemas.microsoft.com/office/drawing/2014/main" id="{1F8CFB7E-CE5B-B6BD-2E76-D132EB6460CC}"/>
+              </a:ext>
+            </a:extLst>
+          </p:cNvPr>
+          <p:cNvSpPr>
+            <a:spLocks noGrp="1"/>
+          </p:cNvSpPr>
+          <p:nvPr>
+            <p:ph type="body" idx="1"/>
+          </p:nvPr>
+        </p:nvSpPr>
+        <p:spPr>
+          <a:xfrm>
+            <a:off x="838200" y="4945063"/>
+            <a:ext cx="10515600" cy="1500187"/>
           </a:xfrm>
         </p:spPr>
         <p:txBody>
@@ -3923,22 +3956,24 @@
           <a:lstStyle/>
           <a:p>
             <a:r>
-              <a:rPr lang="en-US" dirty="0" err="1"/>
-              <a:t>DataOut_m</a:t>
-            </a:r>
-            <a:r>
-              <a:rPr lang="en-US" dirty="0"/>
-              <a:t> shows both jagged and blow up?</a:t>
+              <a:rPr lang="en-US" dirty="0"/>
+              <a:t>Did not use trim years to extend the simulation</a:t>
+            </a:r>
+          </a:p>
+          <a:p>
+            <a:r>
+              <a:rPr lang="en-US" dirty="0"/>
+              <a:t>Used a 100.0 MW annual install</a:t>
             </a:r>
           </a:p>
         </p:txBody>
       </p:sp>
       <p:pic>
         <p:nvPicPr>
-          <p:cNvPr id="4" name="Picture 3" descr="A graph with red and green lines&#10;&#10;Description automatically generated with low confidence">
-            <a:extLst>
-              <a:ext uri="{FF2B5EF4-FFF2-40B4-BE49-F238E27FC236}">
-                <a16:creationId xmlns:a16="http://schemas.microsoft.com/office/drawing/2014/main" id="{A422E2E7-E0E3-6258-3EA2-0E98D9248556}"/>
+          <p:cNvPr id="7" name="Picture 6" descr="A picture containing text, screenshot, line, plot&#10;&#10;Description automatically generated">
+            <a:extLst>
+              <a:ext uri="{FF2B5EF4-FFF2-40B4-BE49-F238E27FC236}">
+                <a16:creationId xmlns:a16="http://schemas.microsoft.com/office/drawing/2014/main" id="{AA1485AC-8F57-2EFC-CDAD-ED3F3DC4F05A}"/>
               </a:ext>
             </a:extLst>
           </p:cNvPr>
@@ -3961,59 +3996,18 @@
         </p:blipFill>
         <p:spPr>
           <a:xfrm>
-            <a:off x="0" y="825229"/>
-            <a:ext cx="8442960" cy="6032772"/>
+            <a:off x="6842749" y="0"/>
+            <a:ext cx="5349251" cy="3959360"/>
           </a:xfrm>
           <a:prstGeom prst="rect">
             <a:avLst/>
           </a:prstGeom>
         </p:spPr>
       </p:pic>
-      <p:sp>
-        <p:nvSpPr>
-          <p:cNvPr id="5" name="TextBox 4">
-            <a:extLst>
-              <a:ext uri="{FF2B5EF4-FFF2-40B4-BE49-F238E27FC236}">
-                <a16:creationId xmlns:a16="http://schemas.microsoft.com/office/drawing/2014/main" id="{18A0F606-F313-93EC-72CF-9763D7C2D530}"/>
-              </a:ext>
-            </a:extLst>
-          </p:cNvPr>
-          <p:cNvSpPr txBox="1"/>
-          <p:nvPr/>
-        </p:nvSpPr>
-        <p:spPr>
-          <a:xfrm>
-            <a:off x="8442960" y="1046480"/>
-            <a:ext cx="3749040" cy="646331"/>
-          </a:xfrm>
-          <a:prstGeom prst="rect">
-            <a:avLst/>
-          </a:prstGeom>
-          <a:noFill/>
-        </p:spPr>
-        <p:txBody>
-          <a:bodyPr wrap="square" rtlCol="0">
-            <a:spAutoFit/>
-          </a:bodyPr>
-          <a:lstStyle/>
-          <a:p>
-            <a:r>
-              <a:rPr lang="en-US" dirty="0"/>
-              <a:t>Area disposed by failures and </a:t>
-            </a:r>
-          </a:p>
-          <a:p>
-            <a:r>
-              <a:rPr lang="en-US" dirty="0"/>
-              <a:t>Area disposed by project life</a:t>
-            </a:r>
-          </a:p>
-        </p:txBody>
-      </p:sp>
     </p:spTree>
     <p:extLst>
       <p:ext uri="{BB962C8B-B14F-4D97-AF65-F5344CB8AC3E}">
-        <p14:creationId xmlns:p14="http://schemas.microsoft.com/office/powerpoint/2010/main" val="1672804357"/>
+        <p14:creationId xmlns:p14="http://schemas.microsoft.com/office/powerpoint/2010/main" val="2196573499"/>
       </p:ext>
     </p:extLst>
   </p:cSld>
@@ -4042,10 +4036,10 @@
       </p:grpSpPr>
       <p:sp>
         <p:nvSpPr>
-          <p:cNvPr id="4" name="Title 3">
-            <a:extLst>
-              <a:ext uri="{FF2B5EF4-FFF2-40B4-BE49-F238E27FC236}">
-                <a16:creationId xmlns:a16="http://schemas.microsoft.com/office/drawing/2014/main" id="{4A77C9AB-FD8E-1AF1-6ECD-1DC4841AC695}"/>
+          <p:cNvPr id="6" name="Title 5">
+            <a:extLst>
+              <a:ext uri="{FF2B5EF4-FFF2-40B4-BE49-F238E27FC236}">
+                <a16:creationId xmlns:a16="http://schemas.microsoft.com/office/drawing/2014/main" id="{7C660CCF-2A48-B1FA-67BA-82A1045AE1EE}"/>
               </a:ext>
             </a:extLst>
           </p:cNvPr>
@@ -4058,66 +4052,29 @@
         </p:nvSpPr>
         <p:spPr>
           <a:xfrm>
-            <a:off x="838200" y="2065338"/>
-            <a:ext cx="10515600" cy="2852737"/>
-          </a:xfrm>
-        </p:spPr>
-        <p:txBody>
-          <a:bodyPr/>
-          <a:lstStyle/>
-          <a:p>
-            <a:r>
-              <a:rPr lang="en-US" dirty="0"/>
-              <a:t>Remove the Trim year extension</a:t>
-            </a:r>
-          </a:p>
-        </p:txBody>
-      </p:sp>
-      <p:sp>
-        <p:nvSpPr>
-          <p:cNvPr id="5" name="Text Placeholder 4">
-            <a:extLst>
-              <a:ext uri="{FF2B5EF4-FFF2-40B4-BE49-F238E27FC236}">
-                <a16:creationId xmlns:a16="http://schemas.microsoft.com/office/drawing/2014/main" id="{1F8CFB7E-CE5B-B6BD-2E76-D132EB6460CC}"/>
-              </a:ext>
-            </a:extLst>
-          </p:cNvPr>
-          <p:cNvSpPr>
-            <a:spLocks noGrp="1"/>
-          </p:cNvSpPr>
-          <p:nvPr>
-            <p:ph type="body" idx="1"/>
-          </p:nvPr>
-        </p:nvSpPr>
-        <p:spPr>
-          <a:xfrm>
-            <a:off x="838200" y="4945063"/>
-            <a:ext cx="10515600" cy="1500187"/>
-          </a:xfrm>
-        </p:spPr>
-        <p:txBody>
-          <a:bodyPr/>
-          <a:lstStyle/>
-          <a:p>
-            <a:r>
-              <a:rPr lang="en-US" dirty="0"/>
-              <a:t>Did not use trim years to extend the simulation</a:t>
-            </a:r>
-          </a:p>
-          <a:p>
-            <a:r>
-              <a:rPr lang="en-US" dirty="0"/>
-              <a:t>Use global projection through 2050</a:t>
+            <a:off x="0" y="1"/>
+            <a:ext cx="9408160" cy="1110858"/>
+          </a:xfrm>
+        </p:spPr>
+        <p:txBody>
+          <a:bodyPr>
+            <a:normAutofit fontScale="90000"/>
+          </a:bodyPr>
+          <a:lstStyle/>
+          <a:p>
+            <a:r>
+              <a:rPr lang="en-US" dirty="0"/>
+              <a:t>Aggregate Results, both jagged and blow up</a:t>
             </a:r>
           </a:p>
         </p:txBody>
       </p:sp>
       <p:pic>
         <p:nvPicPr>
-          <p:cNvPr id="3" name="Picture 2" descr="A picture containing text, screenshot, plot, diagram&#10;&#10;Description automatically generated">
-            <a:extLst>
-              <a:ext uri="{FF2B5EF4-FFF2-40B4-BE49-F238E27FC236}">
-                <a16:creationId xmlns:a16="http://schemas.microsoft.com/office/drawing/2014/main" id="{ABA1E211-A53D-07BE-5767-EE874A2F3B30}"/>
+          <p:cNvPr id="10" name="Picture 9" descr="A picture containing text, diagram, plot, line&#10;&#10;Description automatically generated">
+            <a:extLst>
+              <a:ext uri="{FF2B5EF4-FFF2-40B4-BE49-F238E27FC236}">
+                <a16:creationId xmlns:a16="http://schemas.microsoft.com/office/drawing/2014/main" id="{A1E4679B-20A2-016C-01AA-883BE7FD2355}"/>
               </a:ext>
             </a:extLst>
           </p:cNvPr>
@@ -4140,18 +4097,68 @@
         </p:blipFill>
         <p:spPr>
           <a:xfrm>
-            <a:off x="7043918" y="58670"/>
-            <a:ext cx="5148082" cy="3959360"/>
+            <a:off x="0" y="1115997"/>
+            <a:ext cx="7924800" cy="5742004"/>
           </a:xfrm>
           <a:prstGeom prst="rect">
             <a:avLst/>
           </a:prstGeom>
         </p:spPr>
       </p:pic>
+      <p:sp>
+        <p:nvSpPr>
+          <p:cNvPr id="11" name="TextBox 10">
+            <a:extLst>
+              <a:ext uri="{FF2B5EF4-FFF2-40B4-BE49-F238E27FC236}">
+                <a16:creationId xmlns:a16="http://schemas.microsoft.com/office/drawing/2014/main" id="{642EFF90-7C1C-58D6-DCCB-11AFC53DD141}"/>
+              </a:ext>
+            </a:extLst>
+          </p:cNvPr>
+          <p:cNvSpPr txBox="1"/>
+          <p:nvPr/>
+        </p:nvSpPr>
+        <p:spPr>
+          <a:xfrm>
+            <a:off x="8046720" y="1452880"/>
+            <a:ext cx="4145280" cy="1477328"/>
+          </a:xfrm>
+          <a:prstGeom prst="rect">
+            <a:avLst/>
+          </a:prstGeom>
+          <a:noFill/>
+        </p:spPr>
+        <p:txBody>
+          <a:bodyPr wrap="square" rtlCol="0">
+            <a:spAutoFit/>
+          </a:bodyPr>
+          <a:lstStyle/>
+          <a:p>
+            <a:r>
+              <a:rPr lang="en-US" dirty="0"/>
+              <a:t>From iiyearly2, aggregate results function</a:t>
+            </a:r>
+          </a:p>
+          <a:p>
+            <a:r>
+              <a:rPr lang="en-US" dirty="0"/>
+              <a:t>This is demonstrating the jagged results as well as waste blowing up.</a:t>
+            </a:r>
+          </a:p>
+          <a:p>
+            <a:endParaRPr lang="en-US" dirty="0"/>
+          </a:p>
+          <a:p>
+            <a:r>
+              <a:rPr lang="en-US" dirty="0"/>
+              <a:t>PV ICE waste doesn’t blow up…?</a:t>
+            </a:r>
+          </a:p>
+        </p:txBody>
+      </p:sp>
     </p:spTree>
     <p:extLst>
       <p:ext uri="{BB962C8B-B14F-4D97-AF65-F5344CB8AC3E}">
-        <p14:creationId xmlns:p14="http://schemas.microsoft.com/office/powerpoint/2010/main" val="597274756"/>
+        <p14:creationId xmlns:p14="http://schemas.microsoft.com/office/powerpoint/2010/main" val="3844964183"/>
       </p:ext>
     </p:extLst>
   </p:cSld>
@@ -4180,6 +4187,288 @@
       </p:grpSpPr>
       <p:sp>
         <p:nvSpPr>
+          <p:cNvPr id="2" name="Title 1">
+            <a:extLst>
+              <a:ext uri="{FF2B5EF4-FFF2-40B4-BE49-F238E27FC236}">
+                <a16:creationId xmlns:a16="http://schemas.microsoft.com/office/drawing/2014/main" id="{5DBE12CC-F2A3-C548-A755-B10D0D3F397D}"/>
+              </a:ext>
+            </a:extLst>
+          </p:cNvPr>
+          <p:cNvSpPr>
+            <a:spLocks noGrp="1"/>
+          </p:cNvSpPr>
+          <p:nvPr>
+            <p:ph type="title"/>
+          </p:nvPr>
+        </p:nvSpPr>
+        <p:spPr>
+          <a:xfrm>
+            <a:off x="0" y="0"/>
+            <a:ext cx="10515600" cy="825229"/>
+          </a:xfrm>
+        </p:spPr>
+        <p:txBody>
+          <a:bodyPr/>
+          <a:lstStyle/>
+          <a:p>
+            <a:r>
+              <a:rPr lang="en-US" dirty="0" err="1"/>
+              <a:t>DataOut_m</a:t>
+            </a:r>
+            <a:r>
+              <a:rPr lang="en-US" dirty="0"/>
+              <a:t> shows both jagged and blow up?</a:t>
+            </a:r>
+          </a:p>
+        </p:txBody>
+      </p:sp>
+      <p:pic>
+        <p:nvPicPr>
+          <p:cNvPr id="4" name="Picture 3" descr="A graph with red and green lines&#10;&#10;Description automatically generated with low confidence">
+            <a:extLst>
+              <a:ext uri="{FF2B5EF4-FFF2-40B4-BE49-F238E27FC236}">
+                <a16:creationId xmlns:a16="http://schemas.microsoft.com/office/drawing/2014/main" id="{A422E2E7-E0E3-6258-3EA2-0E98D9248556}"/>
+              </a:ext>
+            </a:extLst>
+          </p:cNvPr>
+          <p:cNvPicPr>
+            <a:picLocks noChangeAspect="1"/>
+          </p:cNvPicPr>
+          <p:nvPr/>
+        </p:nvPicPr>
+        <p:blipFill>
+          <a:blip r:embed="rId2">
+            <a:extLst>
+              <a:ext uri="{28A0092B-C50C-407E-A947-70E740481C1C}">
+                <a14:useLocalDpi xmlns:a14="http://schemas.microsoft.com/office/drawing/2010/main" val="0"/>
+              </a:ext>
+            </a:extLst>
+          </a:blip>
+          <a:stretch>
+            <a:fillRect/>
+          </a:stretch>
+        </p:blipFill>
+        <p:spPr>
+          <a:xfrm>
+            <a:off x="0" y="825229"/>
+            <a:ext cx="8442960" cy="6032772"/>
+          </a:xfrm>
+          <a:prstGeom prst="rect">
+            <a:avLst/>
+          </a:prstGeom>
+        </p:spPr>
+      </p:pic>
+      <p:sp>
+        <p:nvSpPr>
+          <p:cNvPr id="5" name="TextBox 4">
+            <a:extLst>
+              <a:ext uri="{FF2B5EF4-FFF2-40B4-BE49-F238E27FC236}">
+                <a16:creationId xmlns:a16="http://schemas.microsoft.com/office/drawing/2014/main" id="{18A0F606-F313-93EC-72CF-9763D7C2D530}"/>
+              </a:ext>
+            </a:extLst>
+          </p:cNvPr>
+          <p:cNvSpPr txBox="1"/>
+          <p:nvPr/>
+        </p:nvSpPr>
+        <p:spPr>
+          <a:xfrm>
+            <a:off x="8442960" y="1046480"/>
+            <a:ext cx="3749040" cy="646331"/>
+          </a:xfrm>
+          <a:prstGeom prst="rect">
+            <a:avLst/>
+          </a:prstGeom>
+          <a:noFill/>
+        </p:spPr>
+        <p:txBody>
+          <a:bodyPr wrap="square" rtlCol="0">
+            <a:spAutoFit/>
+          </a:bodyPr>
+          <a:lstStyle/>
+          <a:p>
+            <a:r>
+              <a:rPr lang="en-US" dirty="0"/>
+              <a:t>Area disposed by failures and </a:t>
+            </a:r>
+          </a:p>
+          <a:p>
+            <a:r>
+              <a:rPr lang="en-US" dirty="0"/>
+              <a:t>Area disposed by project life</a:t>
+            </a:r>
+          </a:p>
+        </p:txBody>
+      </p:sp>
+    </p:spTree>
+    <p:extLst>
+      <p:ext uri="{BB962C8B-B14F-4D97-AF65-F5344CB8AC3E}">
+        <p14:creationId xmlns:p14="http://schemas.microsoft.com/office/powerpoint/2010/main" val="1672804357"/>
+      </p:ext>
+    </p:extLst>
+  </p:cSld>
+  <p:clrMapOvr>
+    <a:masterClrMapping/>
+  </p:clrMapOvr>
+</p:sld>
+</file>
+
+<file path=ppt/slides/slide17.xml><?xml version="1.0" encoding="utf-8"?>
+<p:sld xmlns:a="http://schemas.openxmlformats.org/drawingml/2006/main" xmlns:r="http://schemas.openxmlformats.org/officeDocument/2006/relationships" xmlns:p="http://schemas.openxmlformats.org/presentationml/2006/main">
+  <p:cSld>
+    <p:spTree>
+      <p:nvGrpSpPr>
+        <p:cNvPr id="1" name=""/>
+        <p:cNvGrpSpPr/>
+        <p:nvPr/>
+      </p:nvGrpSpPr>
+      <p:grpSpPr>
+        <a:xfrm>
+          <a:off x="0" y="0"/>
+          <a:ext cx="0" cy="0"/>
+          <a:chOff x="0" y="0"/>
+          <a:chExt cx="0" cy="0"/>
+        </a:xfrm>
+      </p:grpSpPr>
+      <p:sp>
+        <p:nvSpPr>
+          <p:cNvPr id="4" name="Title 3">
+            <a:extLst>
+              <a:ext uri="{FF2B5EF4-FFF2-40B4-BE49-F238E27FC236}">
+                <a16:creationId xmlns:a16="http://schemas.microsoft.com/office/drawing/2014/main" id="{4A77C9AB-FD8E-1AF1-6ECD-1DC4841AC695}"/>
+              </a:ext>
+            </a:extLst>
+          </p:cNvPr>
+          <p:cNvSpPr>
+            <a:spLocks noGrp="1"/>
+          </p:cNvSpPr>
+          <p:nvPr>
+            <p:ph type="title"/>
+          </p:nvPr>
+        </p:nvSpPr>
+        <p:spPr>
+          <a:xfrm>
+            <a:off x="838200" y="2065338"/>
+            <a:ext cx="10515600" cy="2852737"/>
+          </a:xfrm>
+        </p:spPr>
+        <p:txBody>
+          <a:bodyPr/>
+          <a:lstStyle/>
+          <a:p>
+            <a:r>
+              <a:rPr lang="en-US" dirty="0"/>
+              <a:t>Remove the Trim year extension</a:t>
+            </a:r>
+          </a:p>
+        </p:txBody>
+      </p:sp>
+      <p:sp>
+        <p:nvSpPr>
+          <p:cNvPr id="5" name="Text Placeholder 4">
+            <a:extLst>
+              <a:ext uri="{FF2B5EF4-FFF2-40B4-BE49-F238E27FC236}">
+                <a16:creationId xmlns:a16="http://schemas.microsoft.com/office/drawing/2014/main" id="{1F8CFB7E-CE5B-B6BD-2E76-D132EB6460CC}"/>
+              </a:ext>
+            </a:extLst>
+          </p:cNvPr>
+          <p:cNvSpPr>
+            <a:spLocks noGrp="1"/>
+          </p:cNvSpPr>
+          <p:nvPr>
+            <p:ph type="body" idx="1"/>
+          </p:nvPr>
+        </p:nvSpPr>
+        <p:spPr>
+          <a:xfrm>
+            <a:off x="838200" y="4945063"/>
+            <a:ext cx="10515600" cy="1500187"/>
+          </a:xfrm>
+        </p:spPr>
+        <p:txBody>
+          <a:bodyPr/>
+          <a:lstStyle/>
+          <a:p>
+            <a:r>
+              <a:rPr lang="en-US" dirty="0"/>
+              <a:t>Did not use trim years to extend the simulation</a:t>
+            </a:r>
+          </a:p>
+          <a:p>
+            <a:r>
+              <a:rPr lang="en-US" dirty="0"/>
+              <a:t>Use global projection through 2050</a:t>
+            </a:r>
+          </a:p>
+        </p:txBody>
+      </p:sp>
+      <p:pic>
+        <p:nvPicPr>
+          <p:cNvPr id="3" name="Picture 2" descr="A picture containing text, screenshot, plot, diagram&#10;&#10;Description automatically generated">
+            <a:extLst>
+              <a:ext uri="{FF2B5EF4-FFF2-40B4-BE49-F238E27FC236}">
+                <a16:creationId xmlns:a16="http://schemas.microsoft.com/office/drawing/2014/main" id="{ABA1E211-A53D-07BE-5767-EE874A2F3B30}"/>
+              </a:ext>
+            </a:extLst>
+          </p:cNvPr>
+          <p:cNvPicPr>
+            <a:picLocks noChangeAspect="1"/>
+          </p:cNvPicPr>
+          <p:nvPr/>
+        </p:nvPicPr>
+        <p:blipFill>
+          <a:blip r:embed="rId2">
+            <a:extLst>
+              <a:ext uri="{28A0092B-C50C-407E-A947-70E740481C1C}">
+                <a14:useLocalDpi xmlns:a14="http://schemas.microsoft.com/office/drawing/2010/main" val="0"/>
+              </a:ext>
+            </a:extLst>
+          </a:blip>
+          <a:stretch>
+            <a:fillRect/>
+          </a:stretch>
+        </p:blipFill>
+        <p:spPr>
+          <a:xfrm>
+            <a:off x="7043918" y="58670"/>
+            <a:ext cx="5148082" cy="3959360"/>
+          </a:xfrm>
+          <a:prstGeom prst="rect">
+            <a:avLst/>
+          </a:prstGeom>
+        </p:spPr>
+      </p:pic>
+    </p:spTree>
+    <p:extLst>
+      <p:ext uri="{BB962C8B-B14F-4D97-AF65-F5344CB8AC3E}">
+        <p14:creationId xmlns:p14="http://schemas.microsoft.com/office/powerpoint/2010/main" val="597274756"/>
+      </p:ext>
+    </p:extLst>
+  </p:cSld>
+  <p:clrMapOvr>
+    <a:masterClrMapping/>
+  </p:clrMapOvr>
+</p:sld>
+</file>
+
+<file path=ppt/slides/slide18.xml><?xml version="1.0" encoding="utf-8"?>
+<p:sld xmlns:a="http://schemas.openxmlformats.org/drawingml/2006/main" xmlns:r="http://schemas.openxmlformats.org/officeDocument/2006/relationships" xmlns:p="http://schemas.openxmlformats.org/presentationml/2006/main">
+  <p:cSld>
+    <p:spTree>
+      <p:nvGrpSpPr>
+        <p:cNvPr id="1" name=""/>
+        <p:cNvGrpSpPr/>
+        <p:nvPr/>
+      </p:nvGrpSpPr>
+      <p:grpSpPr>
+        <a:xfrm>
+          <a:off x="0" y="0"/>
+          <a:ext cx="0" cy="0"/>
+          <a:chOff x="0" y="0"/>
+          <a:chExt cx="0" cy="0"/>
+        </a:xfrm>
+      </p:grpSpPr>
+      <p:sp>
+        <p:nvSpPr>
           <p:cNvPr id="6" name="Title 5">
             <a:extLst>
               <a:ext uri="{FF2B5EF4-FFF2-40B4-BE49-F238E27FC236}">
@@ -4331,7 +4620,7 @@
 </p:sld>
 </file>
 
-<file path=ppt/slides/slide17.xml><?xml version="1.0" encoding="utf-8"?>
+<file path=ppt/slides/slide19.xml><?xml version="1.0" encoding="utf-8"?>
 <p:sld xmlns:a="http://schemas.openxmlformats.org/drawingml/2006/main" xmlns:r="http://schemas.openxmlformats.org/officeDocument/2006/relationships" xmlns:p="http://schemas.openxmlformats.org/presentationml/2006/main">
   <p:cSld>
     <p:spTree>

</xml_diff>